<commit_message>
Clean out obsolete files
</commit_message>
<xml_diff>
--- a/results/m05-slides-and-speaker-notes.pptx
+++ b/results/m05-slides-and-speaker-notes.pptx
@@ -5,7 +5,7 @@
     <p:sldMasterId id="2147483648" r:id="rId1"/>
   </p:sldMasterIdLst>
   <p:notesMasterIdLst>
-    <p:NotesMasterId r:id="rId26"/>
+    <p:NotesMasterId r:id="rId31"/>
   </p:notesMasterIdLst>
   <p:sldIdLst>
     <p:sldId id="256" r:id="rId2"/>
@@ -32,6 +32,11 @@
     <p:sldId id="277" r:id="rId23"/>
     <p:sldId id="278" r:id="rId24"/>
     <p:sldId id="279" r:id="rId25"/>
+    <p:sldId id="280" r:id="rId26"/>
+    <p:sldId id="281" r:id="rId27"/>
+    <p:sldId id="282" r:id="rId28"/>
+    <p:sldId id="283" r:id="rId29"/>
+    <p:sldId id="284" r:id="rId30"/>
   </p:sldIdLst>
   <p:sldSz cx="9144000" cy="6858000" type="screen4x3"/>
   <p:notesSz cx="6858000" cy="9144000"/>
@@ -3030,7 +3035,7 @@
           <a:p>
             <a:fld id="{18BDFEC3-8487-43E8-A154-7C12CBC1FFF2}" type="slidenum">
               <a:rPr lang="en-US"/>
-              <a:t>12</a:t>
+              <a:t>13</a:t>
             </a:fld>
             <a:endParaRPr lang="en-US"/>
           </a:p>
@@ -3592,7 +3597,7 @@
           <a:p>
             <a:fld id="{18BDFEC3-8487-43E8-A154-7C12CBC1FFF2}" type="slidenum">
               <a:rPr lang="en-US"/>
-              <a:t>13</a:t>
+              <a:t>14</a:t>
             </a:fld>
             <a:endParaRPr lang="en-US"/>
           </a:p>
@@ -3770,7 +3775,7 @@
           <a:p>
             <a:fld id="{18BDFEC3-8487-43E8-A154-7C12CBC1FFF2}" type="slidenum">
               <a:rPr lang="en-US"/>
-              <a:t>14</a:t>
+              <a:t>15</a:t>
             </a:fld>
             <a:endParaRPr lang="en-US"/>
           </a:p>
@@ -4036,7 +4041,7 @@
           <a:p>
             <a:fld id="{18BDFEC3-8487-43E8-A154-7C12CBC1FFF2}" type="slidenum">
               <a:rPr lang="en-US"/>
-              <a:t>15</a:t>
+              <a:t>16</a:t>
             </a:fld>
             <a:endParaRPr lang="en-US"/>
           </a:p>
@@ -4326,7 +4331,7 @@
           <a:p>
             <a:fld id="{18BDFEC3-8487-43E8-A154-7C12CBC1FFF2}" type="slidenum">
               <a:rPr lang="en-US"/>
-              <a:t>16</a:t>
+              <a:t>17</a:t>
             </a:fld>
             <a:endParaRPr lang="en-US"/>
           </a:p>
@@ -4480,7 +4485,7 @@
           <a:p>
             <a:fld id="{18BDFEC3-8487-43E8-A154-7C12CBC1FFF2}" type="slidenum">
               <a:rPr lang="en-US"/>
-              <a:t>17</a:t>
+              <a:t>18</a:t>
             </a:fld>
             <a:endParaRPr lang="en-US"/>
           </a:p>
@@ -5106,7 +5111,7 @@
           <a:p>
             <a:fld id="{18BDFEC3-8487-43E8-A154-7C12CBC1FFF2}" type="slidenum">
               <a:rPr lang="en-US"/>
-              <a:t>18</a:t>
+              <a:t>20</a:t>
             </a:fld>
             <a:endParaRPr lang="en-US"/>
           </a:p>
@@ -5676,7 +5681,7 @@
           <a:p>
             <a:fld id="{18BDFEC3-8487-43E8-A154-7C12CBC1FFF2}" type="slidenum">
               <a:rPr lang="en-US"/>
-              <a:t>19</a:t>
+              <a:t>21</a:t>
             </a:fld>
             <a:endParaRPr lang="en-US"/>
           </a:p>
@@ -5926,7 +5931,7 @@
           <a:p>
             <a:fld id="{18BDFEC3-8487-43E8-A154-7C12CBC1FFF2}" type="slidenum">
               <a:rPr lang="en-US"/>
-              <a:t>20</a:t>
+              <a:t>23</a:t>
             </a:fld>
             <a:endParaRPr lang="en-US"/>
           </a:p>
@@ -6258,7 +6263,7 @@
           <a:p>
             <a:fld id="{18BDFEC3-8487-43E8-A154-7C12CBC1FFF2}" type="slidenum">
               <a:rPr lang="en-US"/>
-              <a:t>21</a:t>
+              <a:t>24</a:t>
             </a:fld>
             <a:endParaRPr lang="en-US"/>
           </a:p>
@@ -6580,7 +6585,7 @@
           <a:p>
             <a:fld id="{18BDFEC3-8487-43E8-A154-7C12CBC1FFF2}" type="slidenum">
               <a:rPr lang="en-US"/>
-              <a:t>22</a:t>
+              <a:t>26</a:t>
             </a:fld>
             <a:endParaRPr lang="en-US"/>
           </a:p>
@@ -6758,7 +6763,7 @@
           <a:p>
             <a:fld id="{18BDFEC3-8487-43E8-A154-7C12CBC1FFF2}" type="slidenum">
               <a:rPr lang="en-US"/>
-              <a:t>23</a:t>
+              <a:t>27</a:t>
             </a:fld>
             <a:endParaRPr lang="en-US"/>
           </a:p>
@@ -7312,7 +7317,7 @@
           <a:p>
             <a:fld id="{18BDFEC3-8487-43E8-A154-7C12CBC1FFF2}" type="slidenum">
               <a:rPr lang="en-US"/>
-              <a:t>24</a:t>
+              <a:t>28</a:t>
             </a:fld>
             <a:endParaRPr lang="en-US"/>
           </a:p>
@@ -13700,6 +13705,105 @@
             </a:pPr>
             <a:r>
               <a:rPr/>
+              <a:t>Break</a:t>
+            </a:r>
+            <a:r>
+              <a:rPr/>
+              <a:t> </a:t>
+            </a:r>
+            <a:r>
+              <a:rPr/>
+              <a:t>#1</a:t>
+            </a:r>
+          </a:p>
+        </p:txBody>
+      </p:sp>
+      <p:sp>
+        <p:nvSpPr>
+          <p:cNvPr id="3" name="Content Placeholder 2"/>
+          <p:cNvSpPr>
+            <a:spLocks noGrp="1"/>
+          </p:cNvSpPr>
+          <p:nvPr>
+            <p:ph idx="1"/>
+          </p:nvPr>
+        </p:nvSpPr>
+        <p:spPr/>
+        <p:txBody>
+          <a:bodyPr/>
+          <a:lstStyle/>
+          <a:p>
+            <a:pPr lvl="1"/>
+            <a:r>
+              <a:rPr/>
+              <a:t>What have you learned</a:t>
+            </a:r>
+          </a:p>
+          <a:p>
+            <a:pPr lvl="2"/>
+            <a:r>
+              <a:rPr/>
+              <a:t>Reviewing descriptive statistics</a:t>
+            </a:r>
+          </a:p>
+          <a:p>
+            <a:pPr lvl="1"/>
+            <a:r>
+              <a:rPr/>
+              <a:t>What’s next</a:t>
+            </a:r>
+          </a:p>
+          <a:p>
+            <a:pPr lvl="2"/>
+            <a:r>
+              <a:rPr/>
+              <a:t>Correlations and scatterplots</a:t>
+            </a:r>
+          </a:p>
+        </p:txBody>
+      </p:sp>
+    </p:spTree>
+  </p:cSld>
+</p:sld>
+</file>
+
+<file path=ppt/slides/slide13.xml><?xml version="1.0" encoding="utf-8"?>
+<p:sld xmlns:a="http://schemas.openxmlformats.org/drawingml/2006/main" xmlns:r="http://schemas.openxmlformats.org/officeDocument/2006/relationships" xmlns:p="http://schemas.openxmlformats.org/presentationml/2006/main">
+  <p:cSld>
+    <p:spTree>
+      <p:nvGrpSpPr>
+        <p:cNvPr id="1" name=""/>
+        <p:cNvGrpSpPr/>
+        <p:nvPr/>
+      </p:nvGrpSpPr>
+      <p:grpSpPr>
+        <a:xfrm>
+          <a:off x="0" y="0"/>
+          <a:ext cx="0" cy="0"/>
+          <a:chOff x="0" y="0"/>
+          <a:chExt cx="0" cy="0"/>
+        </a:xfrm>
+      </p:grpSpPr>
+      <p:sp>
+        <p:nvSpPr>
+          <p:cNvPr id="2" name="Title 1"/>
+          <p:cNvSpPr>
+            <a:spLocks noGrp="1"/>
+          </p:cNvSpPr>
+          <p:nvPr>
+            <p:ph type="title"/>
+          </p:nvPr>
+        </p:nvSpPr>
+        <p:spPr/>
+        <p:txBody>
+          <a:bodyPr/>
+          <a:lstStyle/>
+          <a:p>
+            <a:pPr lvl="0" marL="0" indent="0">
+              <a:buNone/>
+            </a:pPr>
+            <a:r>
+              <a:rPr/>
               <a:t>SAS</a:t>
             </a:r>
             <a:r>
@@ -13786,7 +13890,7 @@
 </p:sld>
 </file>
 
-<file path=ppt/slides/slide13.xml><?xml version="1.0" encoding="utf-8"?>
+<file path=ppt/slides/slide14.xml><?xml version="1.0" encoding="utf-8"?>
 <p:sld xmlns:a="http://schemas.openxmlformats.org/drawingml/2006/main" xmlns:r="http://schemas.openxmlformats.org/officeDocument/2006/relationships" xmlns:p="http://schemas.openxmlformats.org/presentationml/2006/main">
   <p:cSld>
     <p:spTree>
@@ -13941,7 +14045,7 @@
 </p:sld>
 </file>
 
-<file path=ppt/slides/slide14.xml><?xml version="1.0" encoding="utf-8"?>
+<file path=ppt/slides/slide15.xml><?xml version="1.0" encoding="utf-8"?>
 <p:sld xmlns:a="http://schemas.openxmlformats.org/drawingml/2006/main" xmlns:r="http://schemas.openxmlformats.org/officeDocument/2006/relationships" xmlns:p="http://schemas.openxmlformats.org/presentationml/2006/main">
   <p:cSld>
     <p:spTree>
@@ -14055,7 +14159,7 @@
 </p:sld>
 </file>
 
-<file path=ppt/slides/slide15.xml><?xml version="1.0" encoding="utf-8"?>
+<file path=ppt/slides/slide16.xml><?xml version="1.0" encoding="utf-8"?>
 <p:sld xmlns:a="http://schemas.openxmlformats.org/drawingml/2006/main" xmlns:r="http://schemas.openxmlformats.org/officeDocument/2006/relationships" xmlns:p="http://schemas.openxmlformats.org/presentationml/2006/main">
   <p:cSld>
     <p:spTree>
@@ -14202,7 +14306,7 @@
 </p:sld>
 </file>
 
-<file path=ppt/slides/slide16.xml><?xml version="1.0" encoding="utf-8"?>
+<file path=ppt/slides/slide17.xml><?xml version="1.0" encoding="utf-8"?>
 <p:sld xmlns:a="http://schemas.openxmlformats.org/drawingml/2006/main" xmlns:r="http://schemas.openxmlformats.org/officeDocument/2006/relationships" xmlns:p="http://schemas.openxmlformats.org/presentationml/2006/main">
   <p:cSld>
     <p:spTree>
@@ -14320,7 +14424,7 @@
 </p:sld>
 </file>
 
-<file path=ppt/slides/slide17.xml><?xml version="1.0" encoding="utf-8"?>
+<file path=ppt/slides/slide18.xml><?xml version="1.0" encoding="utf-8"?>
 <p:sld xmlns:a="http://schemas.openxmlformats.org/drawingml/2006/main" xmlns:r="http://schemas.openxmlformats.org/officeDocument/2006/relationships" xmlns:p="http://schemas.openxmlformats.org/presentationml/2006/main">
   <p:cSld>
     <p:spTree>
@@ -14467,7 +14571,7 @@
 </p:sld>
 </file>
 
-<file path=ppt/slides/slide18.xml><?xml version="1.0" encoding="utf-8"?>
+<file path=ppt/slides/slide19.xml><?xml version="1.0" encoding="utf-8"?>
 <p:sld xmlns:a="http://schemas.openxmlformats.org/drawingml/2006/main" xmlns:r="http://schemas.openxmlformats.org/officeDocument/2006/relationships" xmlns:p="http://schemas.openxmlformats.org/presentationml/2006/main">
   <p:cSld>
     <p:spTree>
@@ -14504,6 +14608,217 @@
             </a:pPr>
             <a:r>
               <a:rPr/>
+              <a:t>Break</a:t>
+            </a:r>
+            <a:r>
+              <a:rPr/>
+              <a:t> </a:t>
+            </a:r>
+            <a:r>
+              <a:rPr/>
+              <a:t>#2</a:t>
+            </a:r>
+          </a:p>
+        </p:txBody>
+      </p:sp>
+      <p:sp>
+        <p:nvSpPr>
+          <p:cNvPr id="3" name="Content Placeholder 2"/>
+          <p:cNvSpPr>
+            <a:spLocks noGrp="1"/>
+          </p:cNvSpPr>
+          <p:nvPr>
+            <p:ph idx="1"/>
+          </p:nvPr>
+        </p:nvSpPr>
+        <p:spPr/>
+        <p:txBody>
+          <a:bodyPr/>
+          <a:lstStyle/>
+          <a:p>
+            <a:pPr lvl="1"/>
+            <a:r>
+              <a:rPr/>
+              <a:t>What have you learned</a:t>
+            </a:r>
+          </a:p>
+          <a:p>
+            <a:pPr lvl="2"/>
+            <a:r>
+              <a:rPr/>
+              <a:t>Correlations and scatterplots</a:t>
+            </a:r>
+          </a:p>
+          <a:p>
+            <a:pPr lvl="1"/>
+            <a:r>
+              <a:rPr/>
+              <a:t>Wht’s next</a:t>
+            </a:r>
+          </a:p>
+          <a:p>
+            <a:pPr lvl="2"/>
+            <a:r>
+              <a:rPr/>
+              <a:t>Boxplots</a:t>
+            </a:r>
+          </a:p>
+        </p:txBody>
+      </p:sp>
+    </p:spTree>
+  </p:cSld>
+</p:sld>
+</file>
+
+<file path=ppt/slides/slide2.xml><?xml version="1.0" encoding="utf-8"?>
+<p:sld xmlns:a="http://schemas.openxmlformats.org/drawingml/2006/main" xmlns:r="http://schemas.openxmlformats.org/officeDocument/2006/relationships" xmlns:p="http://schemas.openxmlformats.org/presentationml/2006/main">
+  <p:cSld>
+    <p:spTree>
+      <p:nvGrpSpPr>
+        <p:cNvPr id="1" name=""/>
+        <p:cNvGrpSpPr/>
+        <p:nvPr/>
+      </p:nvGrpSpPr>
+      <p:grpSpPr>
+        <a:xfrm>
+          <a:off x="0" y="0"/>
+          <a:ext cx="0" cy="0"/>
+          <a:chOff x="0" y="0"/>
+          <a:chExt cx="0" cy="0"/>
+        </a:xfrm>
+      </p:grpSpPr>
+      <p:sp>
+        <p:nvSpPr>
+          <p:cNvPr id="2" name="Title 1"/>
+          <p:cNvSpPr>
+            <a:spLocks noGrp="1"/>
+          </p:cNvSpPr>
+          <p:nvPr>
+            <p:ph type="title"/>
+          </p:nvPr>
+        </p:nvSpPr>
+        <p:spPr/>
+        <p:txBody>
+          <a:bodyPr/>
+          <a:lstStyle/>
+          <a:p>
+            <a:pPr lvl="0" marL="0" indent="0">
+              <a:buNone/>
+            </a:pPr>
+            <a:r>
+              <a:rPr/>
+              <a:t>Overview</a:t>
+            </a:r>
+          </a:p>
+        </p:txBody>
+      </p:sp>
+      <p:sp>
+        <p:nvSpPr>
+          <p:cNvPr id="3" name="Content Placeholder 2"/>
+          <p:cNvSpPr>
+            <a:spLocks noGrp="1"/>
+          </p:cNvSpPr>
+          <p:nvPr>
+            <p:ph idx="1"/>
+          </p:nvPr>
+        </p:nvSpPr>
+        <p:spPr/>
+        <p:txBody>
+          <a:bodyPr/>
+          <a:lstStyle/>
+          <a:p>
+            <a:pPr lvl="1"/>
+            <a:r>
+              <a:rPr/>
+              <a:t>Review</a:t>
+            </a:r>
+          </a:p>
+          <a:p>
+            <a:pPr lvl="2"/>
+            <a:r>
+              <a:rPr/>
+              <a:t>proc format, proc freq, proc means</a:t>
+            </a:r>
+          </a:p>
+          <a:p>
+            <a:pPr lvl="1"/>
+            <a:r>
+              <a:rPr/>
+              <a:t>proc corr</a:t>
+            </a:r>
+          </a:p>
+          <a:p>
+            <a:pPr lvl="1"/>
+            <a:r>
+              <a:rPr/>
+              <a:t>proc sgplot</a:t>
+            </a:r>
+          </a:p>
+          <a:p>
+            <a:pPr lvl="2"/>
+            <a:r>
+              <a:rPr/>
+              <a:t>scatterplot</a:t>
+            </a:r>
+          </a:p>
+          <a:p>
+            <a:pPr lvl="2"/>
+            <a:r>
+              <a:rPr/>
+              <a:t>boxplot</a:t>
+            </a:r>
+          </a:p>
+          <a:p>
+            <a:pPr lvl="1"/>
+            <a:r>
+              <a:rPr/>
+              <a:t>by statement</a:t>
+            </a:r>
+          </a:p>
+        </p:txBody>
+      </p:sp>
+    </p:spTree>
+  </p:cSld>
+</p:sld>
+</file>
+
+<file path=ppt/slides/slide20.xml><?xml version="1.0" encoding="utf-8"?>
+<p:sld xmlns:a="http://schemas.openxmlformats.org/drawingml/2006/main" xmlns:r="http://schemas.openxmlformats.org/officeDocument/2006/relationships" xmlns:p="http://schemas.openxmlformats.org/presentationml/2006/main">
+  <p:cSld>
+    <p:spTree>
+      <p:nvGrpSpPr>
+        <p:cNvPr id="1" name=""/>
+        <p:cNvGrpSpPr/>
+        <p:nvPr/>
+      </p:nvGrpSpPr>
+      <p:grpSpPr>
+        <a:xfrm>
+          <a:off x="0" y="0"/>
+          <a:ext cx="0" cy="0"/>
+          <a:chOff x="0" y="0"/>
+          <a:chExt cx="0" cy="0"/>
+        </a:xfrm>
+      </p:grpSpPr>
+      <p:sp>
+        <p:nvSpPr>
+          <p:cNvPr id="2" name="Title 1"/>
+          <p:cNvSpPr>
+            <a:spLocks noGrp="1"/>
+          </p:cNvSpPr>
+          <p:nvPr>
+            <p:ph type="title"/>
+          </p:nvPr>
+        </p:nvSpPr>
+        <p:spPr/>
+        <p:txBody>
+          <a:bodyPr/>
+          <a:lstStyle/>
+          <a:p>
+            <a:pPr lvl="0" marL="0" indent="0">
+              <a:buNone/>
+            </a:pPr>
+            <a:r>
+              <a:rPr/>
               <a:t>SAS</a:t>
             </a:r>
             <a:r>
@@ -14582,7 +14897,7 @@
 </p:sld>
 </file>
 
-<file path=ppt/slides/slide19.xml><?xml version="1.0" encoding="utf-8"?>
+<file path=ppt/slides/slide21.xml><?xml version="1.0" encoding="utf-8"?>
 <p:sld xmlns:a="http://schemas.openxmlformats.org/drawingml/2006/main" xmlns:r="http://schemas.openxmlformats.org/officeDocument/2006/relationships" xmlns:p="http://schemas.openxmlformats.org/presentationml/2006/main">
   <p:cSld>
     <p:spTree>
@@ -14729,7 +15044,7 @@
 </p:sld>
 </file>
 
-<file path=ppt/slides/slide2.xml><?xml version="1.0" encoding="utf-8"?>
+<file path=ppt/slides/slide22.xml><?xml version="1.0" encoding="utf-8"?>
 <p:sld xmlns:a="http://schemas.openxmlformats.org/drawingml/2006/main" xmlns:r="http://schemas.openxmlformats.org/officeDocument/2006/relationships" xmlns:p="http://schemas.openxmlformats.org/presentationml/2006/main">
   <p:cSld>
     <p:spTree>
@@ -14766,7 +15081,15 @@
             </a:pPr>
             <a:r>
               <a:rPr/>
-              <a:t>Overview</a:t>
+              <a:t>Break</a:t>
+            </a:r>
+            <a:r>
+              <a:rPr/>
+              <a:t> </a:t>
+            </a:r>
+            <a:r>
+              <a:rPr/>
+              <a:t>#3</a:t>
             </a:r>
           </a:p>
         </p:txBody>
@@ -14789,49 +15112,28 @@
             <a:pPr lvl="1"/>
             <a:r>
               <a:rPr/>
-              <a:t>Review</a:t>
+              <a:t>What have you learned</a:t>
             </a:r>
           </a:p>
           <a:p>
             <a:pPr lvl="2"/>
             <a:r>
               <a:rPr/>
-              <a:t>proc format, proc freq, proc means</a:t>
+              <a:t>Boxplots</a:t>
             </a:r>
           </a:p>
           <a:p>
             <a:pPr lvl="1"/>
             <a:r>
               <a:rPr/>
-              <a:t>proc corr</a:t>
-            </a:r>
-          </a:p>
-          <a:p>
-            <a:pPr lvl="1"/>
-            <a:r>
-              <a:rPr/>
-              <a:t>proc sgplot</a:t>
+              <a:t>What’s next</a:t>
             </a:r>
           </a:p>
           <a:p>
             <a:pPr lvl="2"/>
             <a:r>
               <a:rPr/>
-              <a:t>scatterplot</a:t>
-            </a:r>
-          </a:p>
-          <a:p>
-            <a:pPr lvl="2"/>
-            <a:r>
-              <a:rPr/>
-              <a:t>boxplot</a:t>
-            </a:r>
-          </a:p>
-          <a:p>
-            <a:pPr lvl="1"/>
-            <a:r>
-              <a:rPr/>
-              <a:t>by statement</a:t>
+              <a:t>Means by group</a:t>
             </a:r>
           </a:p>
         </p:txBody>
@@ -14841,7 +15143,7 @@
 </p:sld>
 </file>
 
-<file path=ppt/slides/slide20.xml><?xml version="1.0" encoding="utf-8"?>
+<file path=ppt/slides/slide23.xml><?xml version="1.0" encoding="utf-8"?>
 <p:sld xmlns:a="http://schemas.openxmlformats.org/drawingml/2006/main" xmlns:r="http://schemas.openxmlformats.org/officeDocument/2006/relationships" xmlns:p="http://schemas.openxmlformats.org/presentationml/2006/main">
   <p:cSld>
     <p:spTree>
@@ -14969,7 +15271,7 @@
 </p:sld>
 </file>
 
-<file path=ppt/slides/slide21.xml><?xml version="1.0" encoding="utf-8"?>
+<file path=ppt/slides/slide24.xml><?xml version="1.0" encoding="utf-8"?>
 <p:sld xmlns:a="http://schemas.openxmlformats.org/drawingml/2006/main" xmlns:r="http://schemas.openxmlformats.org/officeDocument/2006/relationships" xmlns:p="http://schemas.openxmlformats.org/presentationml/2006/main">
   <p:cSld>
     <p:spTree>
@@ -15124,7 +15426,106 @@
 </p:sld>
 </file>
 
-<file path=ppt/slides/slide22.xml><?xml version="1.0" encoding="utf-8"?>
+<file path=ppt/slides/slide25.xml><?xml version="1.0" encoding="utf-8"?>
+<p:sld xmlns:a="http://schemas.openxmlformats.org/drawingml/2006/main" xmlns:r="http://schemas.openxmlformats.org/officeDocument/2006/relationships" xmlns:p="http://schemas.openxmlformats.org/presentationml/2006/main">
+  <p:cSld>
+    <p:spTree>
+      <p:nvGrpSpPr>
+        <p:cNvPr id="1" name=""/>
+        <p:cNvGrpSpPr/>
+        <p:nvPr/>
+      </p:nvGrpSpPr>
+      <p:grpSpPr>
+        <a:xfrm>
+          <a:off x="0" y="0"/>
+          <a:ext cx="0" cy="0"/>
+          <a:chOff x="0" y="0"/>
+          <a:chExt cx="0" cy="0"/>
+        </a:xfrm>
+      </p:grpSpPr>
+      <p:sp>
+        <p:nvSpPr>
+          <p:cNvPr id="2" name="Title 1"/>
+          <p:cNvSpPr>
+            <a:spLocks noGrp="1"/>
+          </p:cNvSpPr>
+          <p:nvPr>
+            <p:ph type="title"/>
+          </p:nvPr>
+        </p:nvSpPr>
+        <p:spPr/>
+        <p:txBody>
+          <a:bodyPr/>
+          <a:lstStyle/>
+          <a:p>
+            <a:pPr lvl="0" marL="0" indent="0">
+              <a:buNone/>
+            </a:pPr>
+            <a:r>
+              <a:rPr/>
+              <a:t>Break</a:t>
+            </a:r>
+            <a:r>
+              <a:rPr/>
+              <a:t> </a:t>
+            </a:r>
+            <a:r>
+              <a:rPr/>
+              <a:t>#4</a:t>
+            </a:r>
+          </a:p>
+        </p:txBody>
+      </p:sp>
+      <p:sp>
+        <p:nvSpPr>
+          <p:cNvPr id="3" name="Content Placeholder 2"/>
+          <p:cNvSpPr>
+            <a:spLocks noGrp="1"/>
+          </p:cNvSpPr>
+          <p:nvPr>
+            <p:ph idx="1"/>
+          </p:nvPr>
+        </p:nvSpPr>
+        <p:spPr/>
+        <p:txBody>
+          <a:bodyPr/>
+          <a:lstStyle/>
+          <a:p>
+            <a:pPr lvl="1"/>
+            <a:r>
+              <a:rPr/>
+              <a:t>What have you learned</a:t>
+            </a:r>
+          </a:p>
+          <a:p>
+            <a:pPr lvl="2"/>
+            <a:r>
+              <a:rPr/>
+              <a:t>Means by group</a:t>
+            </a:r>
+          </a:p>
+          <a:p>
+            <a:pPr lvl="1"/>
+            <a:r>
+              <a:rPr/>
+              <a:t>What’s next</a:t>
+            </a:r>
+          </a:p>
+          <a:p>
+            <a:pPr lvl="2"/>
+            <a:r>
+              <a:rPr/>
+              <a:t>Investigating an odd association</a:t>
+            </a:r>
+          </a:p>
+        </p:txBody>
+      </p:sp>
+    </p:spTree>
+  </p:cSld>
+</p:sld>
+</file>
+
+<file path=ppt/slides/slide26.xml><?xml version="1.0" encoding="utf-8"?>
 <p:sld xmlns:a="http://schemas.openxmlformats.org/drawingml/2006/main" xmlns:r="http://schemas.openxmlformats.org/officeDocument/2006/relationships" xmlns:p="http://schemas.openxmlformats.org/presentationml/2006/main">
   <p:cSld>
     <p:spTree>
@@ -15283,7 +15684,7 @@
 </p:sld>
 </file>
 
-<file path=ppt/slides/slide23.xml><?xml version="1.0" encoding="utf-8"?>
+<file path=ppt/slides/slide27.xml><?xml version="1.0" encoding="utf-8"?>
 <p:sld xmlns:a="http://schemas.openxmlformats.org/drawingml/2006/main" xmlns:r="http://schemas.openxmlformats.org/officeDocument/2006/relationships" xmlns:p="http://schemas.openxmlformats.org/presentationml/2006/main">
   <p:cSld>
     <p:spTree>
@@ -15462,7 +15863,7 @@
 </p:sld>
 </file>
 
-<file path=ppt/slides/slide24.xml><?xml version="1.0" encoding="utf-8"?>
+<file path=ppt/slides/slide28.xml><?xml version="1.0" encoding="utf-8"?>
 <p:sld xmlns:a="http://schemas.openxmlformats.org/drawingml/2006/main" xmlns:r="http://schemas.openxmlformats.org/officeDocument/2006/relationships" xmlns:p="http://schemas.openxmlformats.org/presentationml/2006/main">
   <p:cSld>
     <p:spTree>
@@ -15632,6 +16033,104 @@
             <a:r>
               <a:rPr/>
               <a:t>Output</a:t>
+            </a:r>
+          </a:p>
+        </p:txBody>
+      </p:sp>
+    </p:spTree>
+  </p:cSld>
+</p:sld>
+</file>
+
+<file path=ppt/slides/slide29.xml><?xml version="1.0" encoding="utf-8"?>
+<p:sld xmlns:a="http://schemas.openxmlformats.org/drawingml/2006/main" xmlns:r="http://schemas.openxmlformats.org/officeDocument/2006/relationships" xmlns:p="http://schemas.openxmlformats.org/presentationml/2006/main">
+  <p:cSld>
+    <p:spTree>
+      <p:nvGrpSpPr>
+        <p:cNvPr id="1" name=""/>
+        <p:cNvGrpSpPr/>
+        <p:nvPr/>
+      </p:nvGrpSpPr>
+      <p:grpSpPr>
+        <a:xfrm>
+          <a:off x="0" y="0"/>
+          <a:ext cx="0" cy="0"/>
+          <a:chOff x="0" y="0"/>
+          <a:chExt cx="0" cy="0"/>
+        </a:xfrm>
+      </p:grpSpPr>
+      <p:sp>
+        <p:nvSpPr>
+          <p:cNvPr id="2" name="Title 1"/>
+          <p:cNvSpPr>
+            <a:spLocks noGrp="1"/>
+          </p:cNvSpPr>
+          <p:nvPr>
+            <p:ph type="title"/>
+          </p:nvPr>
+        </p:nvSpPr>
+        <p:spPr/>
+        <p:txBody>
+          <a:bodyPr/>
+          <a:lstStyle/>
+          <a:p>
+            <a:pPr lvl="0" marL="0" indent="0">
+              <a:buNone/>
+            </a:pPr>
+            <a:r>
+              <a:rPr/>
+              <a:t>Summary</a:t>
+            </a:r>
+          </a:p>
+        </p:txBody>
+      </p:sp>
+      <p:sp>
+        <p:nvSpPr>
+          <p:cNvPr id="3" name="Content Placeholder 2"/>
+          <p:cNvSpPr>
+            <a:spLocks noGrp="1"/>
+          </p:cNvSpPr>
+          <p:nvPr>
+            <p:ph idx="1"/>
+          </p:nvPr>
+        </p:nvSpPr>
+        <p:spPr/>
+        <p:txBody>
+          <a:bodyPr/>
+          <a:lstStyle/>
+          <a:p>
+            <a:pPr lvl="1"/>
+            <a:r>
+              <a:rPr/>
+              <a:t>Reviewing descriptive statistcs</a:t>
+            </a:r>
+          </a:p>
+          <a:p>
+            <a:pPr lvl="1"/>
+            <a:r>
+              <a:rPr/>
+              <a:t>Correlations and scatterplots</a:t>
+            </a:r>
+          </a:p>
+          <a:p>
+            <a:pPr lvl="1"/>
+            <a:r>
+              <a:rPr/>
+              <a:t>Boxplots</a:t>
+            </a:r>
+          </a:p>
+          <a:p>
+            <a:pPr lvl="1"/>
+            <a:r>
+              <a:rPr/>
+              <a:t>Means by group</a:t>
+            </a:r>
+          </a:p>
+          <a:p>
+            <a:pPr lvl="1"/>
+            <a:r>
+              <a:rPr/>
+              <a:t>Investigating an odd association</a:t>
             </a:r>
           </a:p>
         </p:txBody>

</xml_diff>